<commit_message>
slidedeck 5 images added
</commit_message>
<xml_diff>
--- a/img/devops.05.pptx
+++ b/img/devops.05.pptx
@@ -6,6 +6,7 @@
   </p:sldMasterIdLst>
   <p:sldIdLst>
     <p:sldId id="256" r:id="rId2"/>
+    <p:sldId id="257" r:id="rId3"/>
   </p:sldIdLst>
   <p:sldSz cx="12192000" cy="6858000"/>
   <p:notesSz cx="6858000" cy="9144000"/>
@@ -3342,12 +3343,967 @@
           <a:chExt cx="0" cy="0"/>
         </a:xfrm>
       </p:grpSpPr>
-      <p:sp>
-        <p:nvSpPr>
-          <p:cNvPr id="4" name="Rectangle: Rounded Corners 3">
-            <a:extLst>
-              <a:ext uri="{FF2B5EF4-FFF2-40B4-BE49-F238E27FC236}">
-                <a16:creationId xmlns:a16="http://schemas.microsoft.com/office/drawing/2014/main" id="{A26ABFF4-9678-4F0F-8909-C251DC7D42C1}"/>
+      <p:grpSp>
+        <p:nvGrpSpPr>
+          <p:cNvPr id="34" name="Group 33">
+            <a:extLst>
+              <a:ext uri="{FF2B5EF4-FFF2-40B4-BE49-F238E27FC236}">
+                <a16:creationId xmlns:a16="http://schemas.microsoft.com/office/drawing/2014/main" id="{AE786AD2-0CCA-4170-9264-DAD5D14BE1DC}"/>
+              </a:ext>
+            </a:extLst>
+          </p:cNvPr>
+          <p:cNvGrpSpPr/>
+          <p:nvPr/>
+        </p:nvGrpSpPr>
+        <p:grpSpPr>
+          <a:xfrm>
+            <a:off x="651761" y="684294"/>
+            <a:ext cx="8684765" cy="4665220"/>
+            <a:chOff x="1708401" y="724934"/>
+            <a:chExt cx="8684765" cy="4665220"/>
+          </a:xfrm>
+        </p:grpSpPr>
+        <p:sp>
+          <p:nvSpPr>
+            <p:cNvPr id="4" name="Rectangle: Rounded Corners 3">
+              <a:extLst>
+                <a:ext uri="{FF2B5EF4-FFF2-40B4-BE49-F238E27FC236}">
+                  <a16:creationId xmlns:a16="http://schemas.microsoft.com/office/drawing/2014/main" id="{A26ABFF4-9678-4F0F-8909-C251DC7D42C1}"/>
+                </a:ext>
+              </a:extLst>
+            </p:cNvPr>
+            <p:cNvSpPr/>
+            <p:nvPr/>
+          </p:nvSpPr>
+          <p:spPr>
+            <a:xfrm>
+              <a:off x="1708401" y="1213447"/>
+              <a:ext cx="7826290" cy="4176707"/>
+            </a:xfrm>
+            <a:prstGeom prst="roundRect">
+              <a:avLst/>
+            </a:prstGeom>
+            <a:ln w="31750"/>
+          </p:spPr>
+          <p:style>
+            <a:lnRef idx="2">
+              <a:schemeClr val="dk1"/>
+            </a:lnRef>
+            <a:fillRef idx="1">
+              <a:schemeClr val="lt1"/>
+            </a:fillRef>
+            <a:effectRef idx="0">
+              <a:schemeClr val="dk1"/>
+            </a:effectRef>
+            <a:fontRef idx="minor">
+              <a:schemeClr val="dk1"/>
+            </a:fontRef>
+          </p:style>
+          <p:txBody>
+            <a:bodyPr rtlCol="0" anchor="ctr"/>
+            <a:lstStyle/>
+            <a:p>
+              <a:pPr algn="ctr"/>
+              <a:endParaRPr lang="de-DE"/>
+            </a:p>
+          </p:txBody>
+        </p:sp>
+        <p:sp>
+          <p:nvSpPr>
+            <p:cNvPr id="5" name="TextBox 4">
+              <a:extLst>
+                <a:ext uri="{FF2B5EF4-FFF2-40B4-BE49-F238E27FC236}">
+                  <a16:creationId xmlns:a16="http://schemas.microsoft.com/office/drawing/2014/main" id="{3312466B-610E-4F81-9ACA-AEE58A457A01}"/>
+                </a:ext>
+              </a:extLst>
+            </p:cNvPr>
+            <p:cNvSpPr txBox="1"/>
+            <p:nvPr/>
+          </p:nvSpPr>
+          <p:spPr>
+            <a:xfrm>
+              <a:off x="5141406" y="724934"/>
+              <a:ext cx="1127937" cy="369332"/>
+            </a:xfrm>
+            <a:prstGeom prst="rect">
+              <a:avLst/>
+            </a:prstGeom>
+            <a:noFill/>
+          </p:spPr>
+          <p:txBody>
+            <a:bodyPr wrap="none" rtlCol="0">
+              <a:spAutoFit/>
+            </a:bodyPr>
+            <a:lstStyle/>
+            <a:p>
+              <a:r>
+                <a:rPr lang="de-DE" dirty="0"/>
+                <a:t>Computer</a:t>
+              </a:r>
+            </a:p>
+          </p:txBody>
+        </p:sp>
+        <p:sp>
+          <p:nvSpPr>
+            <p:cNvPr id="6" name="Rectangle: Rounded Corners 5">
+              <a:extLst>
+                <a:ext uri="{FF2B5EF4-FFF2-40B4-BE49-F238E27FC236}">
+                  <a16:creationId xmlns:a16="http://schemas.microsoft.com/office/drawing/2014/main" id="{237B94E3-4D9B-4567-A534-B2B0FFDDA64F}"/>
+                </a:ext>
+              </a:extLst>
+            </p:cNvPr>
+            <p:cNvSpPr/>
+            <p:nvPr/>
+          </p:nvSpPr>
+          <p:spPr>
+            <a:xfrm>
+              <a:off x="2941607" y="2415394"/>
+              <a:ext cx="1574321" cy="1574321"/>
+            </a:xfrm>
+            <a:prstGeom prst="roundRect">
+              <a:avLst/>
+            </a:prstGeom>
+            <a:ln w="31750"/>
+          </p:spPr>
+          <p:style>
+            <a:lnRef idx="2">
+              <a:schemeClr val="dk1"/>
+            </a:lnRef>
+            <a:fillRef idx="1">
+              <a:schemeClr val="lt1"/>
+            </a:fillRef>
+            <a:effectRef idx="0">
+              <a:schemeClr val="dk1"/>
+            </a:effectRef>
+            <a:fontRef idx="minor">
+              <a:schemeClr val="dk1"/>
+            </a:fontRef>
+          </p:style>
+          <p:txBody>
+            <a:bodyPr rtlCol="0" anchor="ctr"/>
+            <a:lstStyle/>
+            <a:p>
+              <a:pPr algn="ctr"/>
+              <a:endParaRPr lang="de-DE"/>
+            </a:p>
+          </p:txBody>
+        </p:sp>
+        <p:sp>
+          <p:nvSpPr>
+            <p:cNvPr id="8" name="Rectangle: Rounded Corners 7">
+              <a:extLst>
+                <a:ext uri="{FF2B5EF4-FFF2-40B4-BE49-F238E27FC236}">
+                  <a16:creationId xmlns:a16="http://schemas.microsoft.com/office/drawing/2014/main" id="{D2CD3043-4658-4B27-8505-75B5083B2CC8}"/>
+                </a:ext>
+              </a:extLst>
+            </p:cNvPr>
+            <p:cNvSpPr/>
+            <p:nvPr/>
+          </p:nvSpPr>
+          <p:spPr>
+            <a:xfrm>
+              <a:off x="4887240" y="2415394"/>
+              <a:ext cx="1574321" cy="1574321"/>
+            </a:xfrm>
+            <a:prstGeom prst="roundRect">
+              <a:avLst/>
+            </a:prstGeom>
+            <a:ln w="31750"/>
+          </p:spPr>
+          <p:style>
+            <a:lnRef idx="2">
+              <a:schemeClr val="dk1"/>
+            </a:lnRef>
+            <a:fillRef idx="1">
+              <a:schemeClr val="lt1"/>
+            </a:fillRef>
+            <a:effectRef idx="0">
+              <a:schemeClr val="dk1"/>
+            </a:effectRef>
+            <a:fontRef idx="minor">
+              <a:schemeClr val="dk1"/>
+            </a:fontRef>
+          </p:style>
+          <p:txBody>
+            <a:bodyPr rtlCol="0" anchor="ctr"/>
+            <a:lstStyle/>
+            <a:p>
+              <a:pPr algn="ctr"/>
+              <a:endParaRPr lang="de-DE"/>
+            </a:p>
+          </p:txBody>
+        </p:sp>
+        <p:sp>
+          <p:nvSpPr>
+            <p:cNvPr id="10" name="Rectangle: Rounded Corners 9">
+              <a:extLst>
+                <a:ext uri="{FF2B5EF4-FFF2-40B4-BE49-F238E27FC236}">
+                  <a16:creationId xmlns:a16="http://schemas.microsoft.com/office/drawing/2014/main" id="{4DACBEEC-B21D-4D60-BB54-DF49D75D84C9}"/>
+                </a:ext>
+              </a:extLst>
+            </p:cNvPr>
+            <p:cNvSpPr/>
+            <p:nvPr/>
+          </p:nvSpPr>
+          <p:spPr>
+            <a:xfrm>
+              <a:off x="6832873" y="2415394"/>
+              <a:ext cx="1574321" cy="1574321"/>
+            </a:xfrm>
+            <a:prstGeom prst="roundRect">
+              <a:avLst/>
+            </a:prstGeom>
+            <a:ln w="31750"/>
+          </p:spPr>
+          <p:style>
+            <a:lnRef idx="2">
+              <a:schemeClr val="dk1"/>
+            </a:lnRef>
+            <a:fillRef idx="1">
+              <a:schemeClr val="lt1"/>
+            </a:fillRef>
+            <a:effectRef idx="0">
+              <a:schemeClr val="dk1"/>
+            </a:effectRef>
+            <a:fontRef idx="minor">
+              <a:schemeClr val="dk1"/>
+            </a:fontRef>
+          </p:style>
+          <p:txBody>
+            <a:bodyPr rtlCol="0" anchor="ctr"/>
+            <a:lstStyle/>
+            <a:p>
+              <a:pPr algn="ctr"/>
+              <a:endParaRPr lang="de-DE"/>
+            </a:p>
+          </p:txBody>
+        </p:sp>
+        <p:sp>
+          <p:nvSpPr>
+            <p:cNvPr id="12" name="TextBox 11">
+              <a:extLst>
+                <a:ext uri="{FF2B5EF4-FFF2-40B4-BE49-F238E27FC236}">
+                  <a16:creationId xmlns:a16="http://schemas.microsoft.com/office/drawing/2014/main" id="{BEF8EDFC-919A-4125-B199-602B344277CE}"/>
+                </a:ext>
+              </a:extLst>
+            </p:cNvPr>
+            <p:cNvSpPr txBox="1"/>
+            <p:nvPr/>
+          </p:nvSpPr>
+          <p:spPr>
+            <a:xfrm>
+              <a:off x="3472126" y="3989715"/>
+              <a:ext cx="513282" cy="369332"/>
+            </a:xfrm>
+            <a:prstGeom prst="rect">
+              <a:avLst/>
+            </a:prstGeom>
+            <a:noFill/>
+          </p:spPr>
+          <p:txBody>
+            <a:bodyPr wrap="none" rtlCol="0">
+              <a:spAutoFit/>
+            </a:bodyPr>
+            <a:lstStyle/>
+            <a:p>
+              <a:r>
+                <a:rPr lang="de-DE" dirty="0"/>
+                <a:t>VM</a:t>
+              </a:r>
+            </a:p>
+          </p:txBody>
+        </p:sp>
+        <p:sp>
+          <p:nvSpPr>
+            <p:cNvPr id="14" name="TextBox 13">
+              <a:extLst>
+                <a:ext uri="{FF2B5EF4-FFF2-40B4-BE49-F238E27FC236}">
+                  <a16:creationId xmlns:a16="http://schemas.microsoft.com/office/drawing/2014/main" id="{3FAB99C5-6638-4216-8D6B-C34CED88CB2D}"/>
+                </a:ext>
+              </a:extLst>
+            </p:cNvPr>
+            <p:cNvSpPr txBox="1"/>
+            <p:nvPr/>
+          </p:nvSpPr>
+          <p:spPr>
+            <a:xfrm>
+              <a:off x="5417759" y="3989715"/>
+              <a:ext cx="513282" cy="369332"/>
+            </a:xfrm>
+            <a:prstGeom prst="rect">
+              <a:avLst/>
+            </a:prstGeom>
+            <a:noFill/>
+          </p:spPr>
+          <p:txBody>
+            <a:bodyPr wrap="none" rtlCol="0">
+              <a:spAutoFit/>
+            </a:bodyPr>
+            <a:lstStyle/>
+            <a:p>
+              <a:r>
+                <a:rPr lang="de-DE" dirty="0"/>
+                <a:t>VM</a:t>
+              </a:r>
+            </a:p>
+          </p:txBody>
+        </p:sp>
+        <p:sp>
+          <p:nvSpPr>
+            <p:cNvPr id="16" name="TextBox 15">
+              <a:extLst>
+                <a:ext uri="{FF2B5EF4-FFF2-40B4-BE49-F238E27FC236}">
+                  <a16:creationId xmlns:a16="http://schemas.microsoft.com/office/drawing/2014/main" id="{6F8E5591-EF40-45FB-BE44-B62611FF91A3}"/>
+                </a:ext>
+              </a:extLst>
+            </p:cNvPr>
+            <p:cNvSpPr txBox="1"/>
+            <p:nvPr/>
+          </p:nvSpPr>
+          <p:spPr>
+            <a:xfrm>
+              <a:off x="7455032" y="3992424"/>
+              <a:ext cx="513282" cy="369332"/>
+            </a:xfrm>
+            <a:prstGeom prst="rect">
+              <a:avLst/>
+            </a:prstGeom>
+            <a:noFill/>
+          </p:spPr>
+          <p:txBody>
+            <a:bodyPr wrap="none" rtlCol="0">
+              <a:spAutoFit/>
+            </a:bodyPr>
+            <a:lstStyle/>
+            <a:p>
+              <a:r>
+                <a:rPr lang="de-DE" dirty="0"/>
+                <a:t>VM</a:t>
+              </a:r>
+            </a:p>
+          </p:txBody>
+        </p:sp>
+        <p:sp>
+          <p:nvSpPr>
+            <p:cNvPr id="17" name="TextBox 16">
+              <a:extLst>
+                <a:ext uri="{FF2B5EF4-FFF2-40B4-BE49-F238E27FC236}">
+                  <a16:creationId xmlns:a16="http://schemas.microsoft.com/office/drawing/2014/main" id="{A56CEF10-6B50-4BC9-8434-E3E65AF1DF5D}"/>
+                </a:ext>
+              </a:extLst>
+            </p:cNvPr>
+            <p:cNvSpPr txBox="1"/>
+            <p:nvPr/>
+          </p:nvSpPr>
+          <p:spPr>
+            <a:xfrm>
+              <a:off x="3083788" y="3509042"/>
+              <a:ext cx="1351909" cy="369332"/>
+            </a:xfrm>
+            <a:prstGeom prst="rect">
+              <a:avLst/>
+            </a:prstGeom>
+            <a:noFill/>
+          </p:spPr>
+          <p:txBody>
+            <a:bodyPr wrap="none" rtlCol="0">
+              <a:spAutoFit/>
+            </a:bodyPr>
+            <a:lstStyle/>
+            <a:p>
+              <a:r>
+                <a:rPr lang="de-DE" dirty="0"/>
+                <a:t>Windows XP</a:t>
+              </a:r>
+            </a:p>
+          </p:txBody>
+        </p:sp>
+        <p:sp>
+          <p:nvSpPr>
+            <p:cNvPr id="19" name="TextBox 18">
+              <a:extLst>
+                <a:ext uri="{FF2B5EF4-FFF2-40B4-BE49-F238E27FC236}">
+                  <a16:creationId xmlns:a16="http://schemas.microsoft.com/office/drawing/2014/main" id="{2C91A0C7-7DA9-4B2C-8664-833463195BBC}"/>
+                </a:ext>
+              </a:extLst>
+            </p:cNvPr>
+            <p:cNvSpPr txBox="1"/>
+            <p:nvPr/>
+          </p:nvSpPr>
+          <p:spPr>
+            <a:xfrm>
+              <a:off x="4968892" y="3509042"/>
+              <a:ext cx="1472967" cy="369332"/>
+            </a:xfrm>
+            <a:prstGeom prst="rect">
+              <a:avLst/>
+            </a:prstGeom>
+            <a:noFill/>
+          </p:spPr>
+          <p:txBody>
+            <a:bodyPr wrap="none" rtlCol="0">
+              <a:spAutoFit/>
+            </a:bodyPr>
+            <a:lstStyle/>
+            <a:p>
+              <a:r>
+                <a:rPr lang="de-DE" dirty="0"/>
+                <a:t>Ubuntu 16.04</a:t>
+              </a:r>
+            </a:p>
+          </p:txBody>
+        </p:sp>
+        <p:sp>
+          <p:nvSpPr>
+            <p:cNvPr id="21" name="TextBox 20">
+              <a:extLst>
+                <a:ext uri="{FF2B5EF4-FFF2-40B4-BE49-F238E27FC236}">
+                  <a16:creationId xmlns:a16="http://schemas.microsoft.com/office/drawing/2014/main" id="{F4A4EF2B-B381-4EED-8ED5-0CA9799ABAAD}"/>
+                </a:ext>
+              </a:extLst>
+            </p:cNvPr>
+            <p:cNvSpPr txBox="1"/>
+            <p:nvPr/>
+          </p:nvSpPr>
+          <p:spPr>
+            <a:xfrm>
+              <a:off x="7004993" y="3465356"/>
+              <a:ext cx="1230080" cy="369332"/>
+            </a:xfrm>
+            <a:prstGeom prst="rect">
+              <a:avLst/>
+            </a:prstGeom>
+            <a:noFill/>
+          </p:spPr>
+          <p:txBody>
+            <a:bodyPr wrap="none" rtlCol="0">
+              <a:spAutoFit/>
+            </a:bodyPr>
+            <a:lstStyle/>
+            <a:p>
+              <a:r>
+                <a:rPr lang="de-DE" dirty="0"/>
+                <a:t>Windows 8</a:t>
+              </a:r>
+            </a:p>
+          </p:txBody>
+        </p:sp>
+        <p:sp>
+          <p:nvSpPr>
+            <p:cNvPr id="22" name="TextBox 21">
+              <a:extLst>
+                <a:ext uri="{FF2B5EF4-FFF2-40B4-BE49-F238E27FC236}">
+                  <a16:creationId xmlns:a16="http://schemas.microsoft.com/office/drawing/2014/main" id="{1069D579-72F0-4F6B-8B28-8C6F36E50525}"/>
+                </a:ext>
+              </a:extLst>
+            </p:cNvPr>
+            <p:cNvSpPr txBox="1"/>
+            <p:nvPr/>
+          </p:nvSpPr>
+          <p:spPr>
+            <a:xfrm>
+              <a:off x="3332569" y="2026902"/>
+              <a:ext cx="792396" cy="369332"/>
+            </a:xfrm>
+            <a:prstGeom prst="rect">
+              <a:avLst/>
+            </a:prstGeom>
+            <a:noFill/>
+          </p:spPr>
+          <p:txBody>
+            <a:bodyPr wrap="none" rtlCol="0">
+              <a:spAutoFit/>
+            </a:bodyPr>
+            <a:lstStyle/>
+            <a:p>
+              <a:r>
+                <a:rPr lang="de-DE" dirty="0"/>
+                <a:t>1 Core</a:t>
+              </a:r>
+            </a:p>
+          </p:txBody>
+        </p:sp>
+        <p:sp>
+          <p:nvSpPr>
+            <p:cNvPr id="24" name="TextBox 23">
+              <a:extLst>
+                <a:ext uri="{FF2B5EF4-FFF2-40B4-BE49-F238E27FC236}">
+                  <a16:creationId xmlns:a16="http://schemas.microsoft.com/office/drawing/2014/main" id="{4336B11D-BA48-49E1-B422-CD016BC1351C}"/>
+                </a:ext>
+              </a:extLst>
+            </p:cNvPr>
+            <p:cNvSpPr txBox="1"/>
+            <p:nvPr/>
+          </p:nvSpPr>
+          <p:spPr>
+            <a:xfrm>
+              <a:off x="5309177" y="1990392"/>
+              <a:ext cx="792396" cy="369332"/>
+            </a:xfrm>
+            <a:prstGeom prst="rect">
+              <a:avLst/>
+            </a:prstGeom>
+            <a:noFill/>
+          </p:spPr>
+          <p:txBody>
+            <a:bodyPr wrap="none" rtlCol="0">
+              <a:spAutoFit/>
+            </a:bodyPr>
+            <a:lstStyle/>
+            <a:p>
+              <a:r>
+                <a:rPr lang="de-DE" dirty="0"/>
+                <a:t>1 Core</a:t>
+              </a:r>
+            </a:p>
+          </p:txBody>
+        </p:sp>
+        <p:sp>
+          <p:nvSpPr>
+            <p:cNvPr id="26" name="TextBox 25">
+              <a:extLst>
+                <a:ext uri="{FF2B5EF4-FFF2-40B4-BE49-F238E27FC236}">
+                  <a16:creationId xmlns:a16="http://schemas.microsoft.com/office/drawing/2014/main" id="{B2B57768-D469-4E77-A5FD-0223B567657A}"/>
+                </a:ext>
+              </a:extLst>
+            </p:cNvPr>
+            <p:cNvSpPr txBox="1"/>
+            <p:nvPr/>
+          </p:nvSpPr>
+          <p:spPr>
+            <a:xfrm>
+              <a:off x="7191259" y="1990392"/>
+              <a:ext cx="792396" cy="369332"/>
+            </a:xfrm>
+            <a:prstGeom prst="rect">
+              <a:avLst/>
+            </a:prstGeom>
+            <a:noFill/>
+          </p:spPr>
+          <p:txBody>
+            <a:bodyPr wrap="none" rtlCol="0">
+              <a:spAutoFit/>
+            </a:bodyPr>
+            <a:lstStyle/>
+            <a:p>
+              <a:r>
+                <a:rPr lang="de-DE" dirty="0"/>
+                <a:t>2 Core</a:t>
+              </a:r>
+            </a:p>
+          </p:txBody>
+        </p:sp>
+        <p:sp>
+          <p:nvSpPr>
+            <p:cNvPr id="28" name="TextBox 27">
+              <a:extLst>
+                <a:ext uri="{FF2B5EF4-FFF2-40B4-BE49-F238E27FC236}">
+                  <a16:creationId xmlns:a16="http://schemas.microsoft.com/office/drawing/2014/main" id="{87B67EE2-0810-4E94-8C32-E1E3121FE755}"/>
+                </a:ext>
+              </a:extLst>
+            </p:cNvPr>
+            <p:cNvSpPr txBox="1"/>
+            <p:nvPr/>
+          </p:nvSpPr>
+          <p:spPr>
+            <a:xfrm>
+              <a:off x="5278202" y="1290000"/>
+              <a:ext cx="792396" cy="369332"/>
+            </a:xfrm>
+            <a:prstGeom prst="rect">
+              <a:avLst/>
+            </a:prstGeom>
+            <a:noFill/>
+          </p:spPr>
+          <p:txBody>
+            <a:bodyPr wrap="none" rtlCol="0">
+              <a:spAutoFit/>
+            </a:bodyPr>
+            <a:lstStyle/>
+            <a:p>
+              <a:r>
+                <a:rPr lang="de-DE" dirty="0"/>
+                <a:t>2 Core</a:t>
+              </a:r>
+            </a:p>
+          </p:txBody>
+        </p:sp>
+        <p:sp>
+          <p:nvSpPr>
+            <p:cNvPr id="29" name="Right Brace 28">
+              <a:extLst>
+                <a:ext uri="{FF2B5EF4-FFF2-40B4-BE49-F238E27FC236}">
+                  <a16:creationId xmlns:a16="http://schemas.microsoft.com/office/drawing/2014/main" id="{9E616521-5062-4486-820D-EFDFA2CE1787}"/>
+                </a:ext>
+              </a:extLst>
+            </p:cNvPr>
+            <p:cNvSpPr/>
+            <p:nvPr/>
+          </p:nvSpPr>
+          <p:spPr>
+            <a:xfrm>
+              <a:off x="9783704" y="2219696"/>
+              <a:ext cx="175783" cy="2139351"/>
+            </a:xfrm>
+            <a:prstGeom prst="rightBrace">
+              <a:avLst/>
+            </a:prstGeom>
+          </p:spPr>
+          <p:style>
+            <a:lnRef idx="1">
+              <a:schemeClr val="dk1"/>
+            </a:lnRef>
+            <a:fillRef idx="0">
+              <a:schemeClr val="dk1"/>
+            </a:fillRef>
+            <a:effectRef idx="0">
+              <a:schemeClr val="dk1"/>
+            </a:effectRef>
+            <a:fontRef idx="minor">
+              <a:schemeClr val="tx1"/>
+            </a:fontRef>
+          </p:style>
+          <p:txBody>
+            <a:bodyPr rtlCol="0" anchor="ctr"/>
+            <a:lstStyle/>
+            <a:p>
+              <a:pPr algn="ctr"/>
+              <a:endParaRPr lang="de-DE"/>
+            </a:p>
+          </p:txBody>
+        </p:sp>
+        <p:sp>
+          <p:nvSpPr>
+            <p:cNvPr id="31" name="TextBox 30">
+              <a:extLst>
+                <a:ext uri="{FF2B5EF4-FFF2-40B4-BE49-F238E27FC236}">
+                  <a16:creationId xmlns:a16="http://schemas.microsoft.com/office/drawing/2014/main" id="{DC608E85-0EDE-46E6-ADAC-639C86B446D8}"/>
+                </a:ext>
+              </a:extLst>
+            </p:cNvPr>
+            <p:cNvSpPr txBox="1"/>
+            <p:nvPr/>
+          </p:nvSpPr>
+          <p:spPr>
+            <a:xfrm rot="5400000">
+              <a:off x="9288280" y="3104705"/>
+              <a:ext cx="1840440" cy="369332"/>
+            </a:xfrm>
+            <a:prstGeom prst="rect">
+              <a:avLst/>
+            </a:prstGeom>
+            <a:noFill/>
+          </p:spPr>
+          <p:txBody>
+            <a:bodyPr wrap="none" rtlCol="0">
+              <a:spAutoFit/>
+            </a:bodyPr>
+            <a:lstStyle/>
+            <a:p>
+              <a:r>
+                <a:rPr lang="de-DE" sz="1800" dirty="0"/>
+                <a:t>»</a:t>
+              </a:r>
+              <a:r>
+                <a:rPr lang="de-DE" dirty="0"/>
+                <a:t>Fake Computer</a:t>
+              </a:r>
+              <a:r>
+                <a:rPr lang="de-DE" sz="1800" dirty="0"/>
+                <a:t>«</a:t>
+              </a:r>
+              <a:endParaRPr lang="de-DE" dirty="0"/>
+            </a:p>
+          </p:txBody>
+        </p:sp>
+      </p:grpSp>
+      <p:sp>
+        <p:nvSpPr>
+          <p:cNvPr id="36" name="TextBox 35">
+            <a:extLst>
+              <a:ext uri="{FF2B5EF4-FFF2-40B4-BE49-F238E27FC236}">
+                <a16:creationId xmlns:a16="http://schemas.microsoft.com/office/drawing/2014/main" id="{A53B25D9-E125-4577-BF1C-59A54CD38AD3}"/>
+              </a:ext>
+            </a:extLst>
+          </p:cNvPr>
+          <p:cNvSpPr txBox="1"/>
+          <p:nvPr/>
+        </p:nvSpPr>
+        <p:spPr>
+          <a:xfrm>
+            <a:off x="3679703" y="4851187"/>
+            <a:ext cx="1770406" cy="369332"/>
+          </a:xfrm>
+          <a:prstGeom prst="rect">
+            <a:avLst/>
+          </a:prstGeom>
+          <a:noFill/>
+        </p:spPr>
+        <p:txBody>
+          <a:bodyPr wrap="square" rtlCol="0">
+            <a:spAutoFit/>
+          </a:bodyPr>
+          <a:lstStyle/>
+          <a:p>
+            <a:pPr algn="ctr"/>
+            <a:r>
+              <a:rPr lang="de-DE" dirty="0"/>
+              <a:t>Windows 10</a:t>
+            </a:r>
+          </a:p>
+        </p:txBody>
+      </p:sp>
+      <p:cxnSp>
+        <p:nvCxnSpPr>
+          <p:cNvPr id="38" name="Straight Arrow Connector 37">
+            <a:extLst>
+              <a:ext uri="{FF2B5EF4-FFF2-40B4-BE49-F238E27FC236}">
+                <a16:creationId xmlns:a16="http://schemas.microsoft.com/office/drawing/2014/main" id="{C3CE315B-5682-48D2-B8E2-8B5711D28152}"/>
+              </a:ext>
+            </a:extLst>
+          </p:cNvPr>
+          <p:cNvCxnSpPr>
+            <a:cxnSpLocks/>
+          </p:cNvCxnSpPr>
+          <p:nvPr/>
+        </p:nvCxnSpPr>
+        <p:spPr>
+          <a:xfrm flipH="1" flipV="1">
+            <a:off x="7416163" y="3964255"/>
+            <a:ext cx="1190582" cy="1837105"/>
+          </a:xfrm>
+          <a:prstGeom prst="straightConnector1">
+            <a:avLst/>
+          </a:prstGeom>
+          <a:ln w="19050">
+            <a:solidFill>
+              <a:schemeClr val="tx1"/>
+            </a:solidFill>
+            <a:prstDash val="dash"/>
+            <a:tailEnd type="triangle" w="lg" len="lg"/>
+          </a:ln>
+        </p:spPr>
+        <p:style>
+          <a:lnRef idx="1">
+            <a:schemeClr val="accent1"/>
+          </a:lnRef>
+          <a:fillRef idx="0">
+            <a:schemeClr val="accent1"/>
+          </a:fillRef>
+          <a:effectRef idx="0">
+            <a:schemeClr val="accent1"/>
+          </a:effectRef>
+          <a:fontRef idx="minor">
+            <a:schemeClr val="tx1"/>
+          </a:fontRef>
+        </p:style>
+      </p:cxnSp>
+      <p:cxnSp>
+        <p:nvCxnSpPr>
+          <p:cNvPr id="40" name="Straight Arrow Connector 39">
+            <a:extLst>
+              <a:ext uri="{FF2B5EF4-FFF2-40B4-BE49-F238E27FC236}">
+                <a16:creationId xmlns:a16="http://schemas.microsoft.com/office/drawing/2014/main" id="{0A3E61F6-FE80-4B74-AA06-914F343FF242}"/>
+              </a:ext>
+            </a:extLst>
+          </p:cNvPr>
+          <p:cNvCxnSpPr>
+            <a:cxnSpLocks/>
+          </p:cNvCxnSpPr>
+          <p:nvPr/>
+        </p:nvCxnSpPr>
+        <p:spPr>
+          <a:xfrm flipH="1" flipV="1">
+            <a:off x="5204321" y="4133741"/>
+            <a:ext cx="3338077" cy="1745524"/>
+          </a:xfrm>
+          <a:prstGeom prst="straightConnector1">
+            <a:avLst/>
+          </a:prstGeom>
+          <a:ln w="19050">
+            <a:solidFill>
+              <a:schemeClr val="tx1"/>
+            </a:solidFill>
+            <a:prstDash val="dash"/>
+            <a:tailEnd type="triangle" w="lg" len="lg"/>
+          </a:ln>
+        </p:spPr>
+        <p:style>
+          <a:lnRef idx="1">
+            <a:schemeClr val="accent1"/>
+          </a:lnRef>
+          <a:fillRef idx="0">
+            <a:schemeClr val="accent1"/>
+          </a:fillRef>
+          <a:effectRef idx="0">
+            <a:schemeClr val="accent1"/>
+          </a:effectRef>
+          <a:fontRef idx="minor">
+            <a:schemeClr val="tx1"/>
+          </a:fontRef>
+        </p:style>
+      </p:cxnSp>
+      <p:cxnSp>
+        <p:nvCxnSpPr>
+          <p:cNvPr id="43" name="Straight Arrow Connector 42">
+            <a:extLst>
+              <a:ext uri="{FF2B5EF4-FFF2-40B4-BE49-F238E27FC236}">
+                <a16:creationId xmlns:a16="http://schemas.microsoft.com/office/drawing/2014/main" id="{79B6F127-8762-4649-B6A4-AD31BCC36D8B}"/>
+              </a:ext>
+            </a:extLst>
+          </p:cNvPr>
+          <p:cNvCxnSpPr>
+            <a:cxnSpLocks/>
+          </p:cNvCxnSpPr>
+          <p:nvPr/>
+        </p:nvCxnSpPr>
+        <p:spPr>
+          <a:xfrm flipH="1" flipV="1">
+            <a:off x="3038206" y="4145422"/>
+            <a:ext cx="5439845" cy="1808726"/>
+          </a:xfrm>
+          <a:prstGeom prst="straightConnector1">
+            <a:avLst/>
+          </a:prstGeom>
+          <a:ln w="19050">
+            <a:solidFill>
+              <a:schemeClr val="tx1"/>
+            </a:solidFill>
+            <a:prstDash val="dash"/>
+            <a:tailEnd type="triangle" w="lg" len="lg"/>
+          </a:ln>
+        </p:spPr>
+        <p:style>
+          <a:lnRef idx="1">
+            <a:schemeClr val="accent1"/>
+          </a:lnRef>
+          <a:fillRef idx="0">
+            <a:schemeClr val="accent1"/>
+          </a:fillRef>
+          <a:effectRef idx="0">
+            <a:schemeClr val="accent1"/>
+          </a:effectRef>
+          <a:fontRef idx="minor">
+            <a:schemeClr val="tx1"/>
+          </a:fontRef>
+        </p:style>
+      </p:cxnSp>
+      <p:cxnSp>
+        <p:nvCxnSpPr>
+          <p:cNvPr id="46" name="Straight Arrow Connector 45">
+            <a:extLst>
+              <a:ext uri="{FF2B5EF4-FFF2-40B4-BE49-F238E27FC236}">
+                <a16:creationId xmlns:a16="http://schemas.microsoft.com/office/drawing/2014/main" id="{06EE1A1F-49D0-4673-9C5E-25E401134B90}"/>
+              </a:ext>
+            </a:extLst>
+          </p:cNvPr>
+          <p:cNvCxnSpPr>
+            <a:cxnSpLocks/>
+          </p:cNvCxnSpPr>
+          <p:nvPr/>
+        </p:nvCxnSpPr>
+        <p:spPr>
+          <a:xfrm flipH="1" flipV="1">
+            <a:off x="5384708" y="5194129"/>
+            <a:ext cx="2953557" cy="822910"/>
+          </a:xfrm>
+          <a:prstGeom prst="straightConnector1">
+            <a:avLst/>
+          </a:prstGeom>
+          <a:ln w="19050">
+            <a:solidFill>
+              <a:schemeClr val="tx1"/>
+            </a:solidFill>
+            <a:prstDash val="dash"/>
+            <a:tailEnd type="triangle" w="lg" len="lg"/>
+          </a:ln>
+        </p:spPr>
+        <p:style>
+          <a:lnRef idx="1">
+            <a:schemeClr val="accent1"/>
+          </a:lnRef>
+          <a:fillRef idx="0">
+            <a:schemeClr val="accent1"/>
+          </a:fillRef>
+          <a:effectRef idx="0">
+            <a:schemeClr val="accent1"/>
+          </a:effectRef>
+          <a:fontRef idx="minor">
+            <a:schemeClr val="tx1"/>
+          </a:fontRef>
+        </p:style>
+      </p:cxnSp>
+      <p:sp>
+        <p:nvSpPr>
+          <p:cNvPr id="56" name="TextBox 55">
+            <a:extLst>
+              <a:ext uri="{FF2B5EF4-FFF2-40B4-BE49-F238E27FC236}">
+                <a16:creationId xmlns:a16="http://schemas.microsoft.com/office/drawing/2014/main" id="{A0B8D478-AF85-4629-A845-92B79EE11AA3}"/>
+              </a:ext>
+            </a:extLst>
+          </p:cNvPr>
+          <p:cNvSpPr txBox="1"/>
+          <p:nvPr/>
+        </p:nvSpPr>
+        <p:spPr>
+          <a:xfrm>
+            <a:off x="8518652" y="5798651"/>
+            <a:ext cx="3233321" cy="369332"/>
+          </a:xfrm>
+          <a:prstGeom prst="rect">
+            <a:avLst/>
+          </a:prstGeom>
+          <a:noFill/>
+        </p:spPr>
+        <p:txBody>
+          <a:bodyPr wrap="none" rtlCol="0">
+            <a:spAutoFit/>
+          </a:bodyPr>
+          <a:lstStyle/>
+          <a:p>
+            <a:r>
+              <a:rPr lang="de-DE" dirty="0"/>
+              <a:t>Vier (4!!!) Betriebssystem Kernel</a:t>
+            </a:r>
+          </a:p>
+        </p:txBody>
+      </p:sp>
+    </p:spTree>
+    <p:extLst>
+      <p:ext uri="{BB962C8B-B14F-4D97-AF65-F5344CB8AC3E}">
+        <p14:creationId xmlns:p14="http://schemas.microsoft.com/office/powerpoint/2010/main" val="2671065053"/>
+      </p:ext>
+    </p:extLst>
+  </p:cSld>
+  <p:clrMapOvr>
+    <a:masterClrMapping/>
+  </p:clrMapOvr>
+</p:sld>
+</file>
+
+<file path=ppt/slides/slide2.xml><?xml version="1.0" encoding="utf-8"?>
+<p:sld xmlns:a="http://schemas.openxmlformats.org/drawingml/2006/main" xmlns:r="http://schemas.openxmlformats.org/officeDocument/2006/relationships" xmlns:p="http://schemas.openxmlformats.org/presentationml/2006/main">
+  <p:cSld>
+    <p:spTree>
+      <p:nvGrpSpPr>
+        <p:cNvPr id="1" name=""/>
+        <p:cNvGrpSpPr/>
+        <p:nvPr/>
+      </p:nvGrpSpPr>
+      <p:grpSpPr>
+        <a:xfrm>
+          <a:off x="0" y="0"/>
+          <a:ext cx="0" cy="0"/>
+          <a:chOff x="0" y="0"/>
+          <a:chExt cx="0" cy="0"/>
+        </a:xfrm>
+      </p:grpSpPr>
+      <p:sp>
+        <p:nvSpPr>
+          <p:cNvPr id="5" name="Rectangle: Rounded Corners 4">
+            <a:extLst>
+              <a:ext uri="{FF2B5EF4-FFF2-40B4-BE49-F238E27FC236}">
+                <a16:creationId xmlns:a16="http://schemas.microsoft.com/office/drawing/2014/main" id="{422F7442-7E3A-4EA6-8EA7-F1F80E3C24E5}"/>
               </a:ext>
             </a:extLst>
           </p:cNvPr>
@@ -3356,12 +4312,13 @@
         </p:nvSpPr>
         <p:spPr>
           <a:xfrm>
-            <a:off x="1708401" y="1213447"/>
+            <a:off x="651761" y="1172807"/>
             <a:ext cx="7826290" cy="4176707"/>
           </a:xfrm>
           <a:prstGeom prst="roundRect">
             <a:avLst/>
           </a:prstGeom>
+          <a:ln w="31750"/>
         </p:spPr>
         <p:style>
           <a:lnRef idx="2">
@@ -3388,10 +4345,10 @@
       </p:sp>
       <p:sp>
         <p:nvSpPr>
-          <p:cNvPr id="5" name="TextBox 4">
-            <a:extLst>
-              <a:ext uri="{FF2B5EF4-FFF2-40B4-BE49-F238E27FC236}">
-                <a16:creationId xmlns:a16="http://schemas.microsoft.com/office/drawing/2014/main" id="{3312466B-610E-4F81-9ACA-AEE58A457A01}"/>
+          <p:cNvPr id="7" name="TextBox 6">
+            <a:extLst>
+              <a:ext uri="{FF2B5EF4-FFF2-40B4-BE49-F238E27FC236}">
+                <a16:creationId xmlns:a16="http://schemas.microsoft.com/office/drawing/2014/main" id="{8DC3BEEB-DAA7-43B5-BE82-0A2EC8F5F242}"/>
               </a:ext>
             </a:extLst>
           </p:cNvPr>
@@ -3400,7 +4357,7 @@
         </p:nvSpPr>
         <p:spPr>
           <a:xfrm>
-            <a:off x="5057578" y="5512279"/>
+            <a:off x="4084766" y="684294"/>
             <a:ext cx="1127937" cy="369332"/>
           </a:xfrm>
           <a:prstGeom prst="rect">
@@ -3423,10 +4380,81 @@
       </p:sp>
       <p:sp>
         <p:nvSpPr>
-          <p:cNvPr id="6" name="Rectangle: Rounded Corners 5">
-            <a:extLst>
-              <a:ext uri="{FF2B5EF4-FFF2-40B4-BE49-F238E27FC236}">
-                <a16:creationId xmlns:a16="http://schemas.microsoft.com/office/drawing/2014/main" id="{237B94E3-4D9B-4567-A534-B2B0FFDDA64F}"/>
+          <p:cNvPr id="9" name="TextBox 8">
+            <a:extLst>
+              <a:ext uri="{FF2B5EF4-FFF2-40B4-BE49-F238E27FC236}">
+                <a16:creationId xmlns:a16="http://schemas.microsoft.com/office/drawing/2014/main" id="{9FDAA5FD-0AF0-4B6A-8E5F-EB1508965F19}"/>
+              </a:ext>
+            </a:extLst>
+          </p:cNvPr>
+          <p:cNvSpPr txBox="1"/>
+          <p:nvPr/>
+        </p:nvSpPr>
+        <p:spPr>
+          <a:xfrm>
+            <a:off x="4221562" y="1249360"/>
+            <a:ext cx="792396" cy="369332"/>
+          </a:xfrm>
+          <a:prstGeom prst="rect">
+            <a:avLst/>
+          </a:prstGeom>
+          <a:noFill/>
+        </p:spPr>
+        <p:txBody>
+          <a:bodyPr wrap="none" rtlCol="0">
+            <a:spAutoFit/>
+          </a:bodyPr>
+          <a:lstStyle/>
+          <a:p>
+            <a:r>
+              <a:rPr lang="de-DE" dirty="0"/>
+              <a:t>6 Core</a:t>
+            </a:r>
+          </a:p>
+        </p:txBody>
+      </p:sp>
+      <p:sp>
+        <p:nvSpPr>
+          <p:cNvPr id="11" name="TextBox 10">
+            <a:extLst>
+              <a:ext uri="{FF2B5EF4-FFF2-40B4-BE49-F238E27FC236}">
+                <a16:creationId xmlns:a16="http://schemas.microsoft.com/office/drawing/2014/main" id="{57BE27B6-7B14-4540-9300-4C87F772F8B8}"/>
+              </a:ext>
+            </a:extLst>
+          </p:cNvPr>
+          <p:cNvSpPr txBox="1"/>
+          <p:nvPr/>
+        </p:nvSpPr>
+        <p:spPr>
+          <a:xfrm>
+            <a:off x="3679703" y="4851187"/>
+            <a:ext cx="1770406" cy="369332"/>
+          </a:xfrm>
+          <a:prstGeom prst="rect">
+            <a:avLst/>
+          </a:prstGeom>
+          <a:noFill/>
+        </p:spPr>
+        <p:txBody>
+          <a:bodyPr wrap="square" rtlCol="0">
+            <a:spAutoFit/>
+          </a:bodyPr>
+          <a:lstStyle/>
+          <a:p>
+            <a:pPr algn="ctr"/>
+            <a:r>
+              <a:rPr lang="de-DE" dirty="0"/>
+              <a:t>Ubuntu 20.04</a:t>
+            </a:r>
+          </a:p>
+        </p:txBody>
+      </p:sp>
+      <p:sp>
+        <p:nvSpPr>
+          <p:cNvPr id="12" name="Hexagon 11">
+            <a:extLst>
+              <a:ext uri="{FF2B5EF4-FFF2-40B4-BE49-F238E27FC236}">
+                <a16:creationId xmlns:a16="http://schemas.microsoft.com/office/drawing/2014/main" id="{8C356AC6-0ED7-41DF-BE17-34F33DF377D4}"/>
               </a:ext>
             </a:extLst>
           </p:cNvPr>
@@ -3435,12 +4463,13 @@
         </p:nvSpPr>
         <p:spPr>
           <a:xfrm>
-            <a:off x="2941607" y="2415394"/>
-            <a:ext cx="1574321" cy="1574321"/>
+            <a:off x="2357120" y="1971040"/>
+            <a:ext cx="671779" cy="579120"/>
           </a:xfrm>
-          <a:prstGeom prst="roundRect">
+          <a:prstGeom prst="hexagon">
             <a:avLst/>
           </a:prstGeom>
+          <a:ln w="31750"/>
         </p:spPr>
         <p:style>
           <a:lnRef idx="2">
@@ -3461,16 +4490,20 @@
           <a:lstStyle/>
           <a:p>
             <a:pPr algn="ctr"/>
-            <a:endParaRPr lang="de-DE"/>
-          </a:p>
-        </p:txBody>
-      </p:sp>
-      <p:sp>
-        <p:nvSpPr>
-          <p:cNvPr id="8" name="Rectangle: Rounded Corners 7">
-            <a:extLst>
-              <a:ext uri="{FF2B5EF4-FFF2-40B4-BE49-F238E27FC236}">
-                <a16:creationId xmlns:a16="http://schemas.microsoft.com/office/drawing/2014/main" id="{D2CD3043-4658-4B27-8505-75B5083B2CC8}"/>
+            <a:endParaRPr lang="de-DE">
+              <a:solidFill>
+                <a:schemeClr val="dk1"/>
+              </a:solidFill>
+            </a:endParaRPr>
+          </a:p>
+        </p:txBody>
+      </p:sp>
+      <p:sp>
+        <p:nvSpPr>
+          <p:cNvPr id="14" name="Hexagon 13">
+            <a:extLst>
+              <a:ext uri="{FF2B5EF4-FFF2-40B4-BE49-F238E27FC236}">
+                <a16:creationId xmlns:a16="http://schemas.microsoft.com/office/drawing/2014/main" id="{0E7DF981-8674-4A79-A361-F3CFB17B2699}"/>
               </a:ext>
             </a:extLst>
           </p:cNvPr>
@@ -3479,12 +4512,13 @@
         </p:nvSpPr>
         <p:spPr>
           <a:xfrm>
-            <a:off x="4887240" y="2415394"/>
-            <a:ext cx="1574321" cy="1574321"/>
+            <a:off x="1615440" y="2682040"/>
+            <a:ext cx="671779" cy="579120"/>
           </a:xfrm>
-          <a:prstGeom prst="roundRect">
+          <a:prstGeom prst="hexagon">
             <a:avLst/>
           </a:prstGeom>
+          <a:ln w="31750"/>
         </p:spPr>
         <p:style>
           <a:lnRef idx="2">
@@ -3505,16 +4539,20 @@
           <a:lstStyle/>
           <a:p>
             <a:pPr algn="ctr"/>
-            <a:endParaRPr lang="de-DE"/>
-          </a:p>
-        </p:txBody>
-      </p:sp>
-      <p:sp>
-        <p:nvSpPr>
-          <p:cNvPr id="10" name="Rectangle: Rounded Corners 9">
-            <a:extLst>
-              <a:ext uri="{FF2B5EF4-FFF2-40B4-BE49-F238E27FC236}">
-                <a16:creationId xmlns:a16="http://schemas.microsoft.com/office/drawing/2014/main" id="{4DACBEEC-B21D-4D60-BB54-DF49D75D84C9}"/>
+            <a:endParaRPr lang="de-DE">
+              <a:solidFill>
+                <a:schemeClr val="dk1"/>
+              </a:solidFill>
+            </a:endParaRPr>
+          </a:p>
+        </p:txBody>
+      </p:sp>
+      <p:sp>
+        <p:nvSpPr>
+          <p:cNvPr id="18" name="Hexagon 17">
+            <a:extLst>
+              <a:ext uri="{FF2B5EF4-FFF2-40B4-BE49-F238E27FC236}">
+                <a16:creationId xmlns:a16="http://schemas.microsoft.com/office/drawing/2014/main" id="{5797C618-7AC5-4022-B9E2-3230544B1B6D}"/>
               </a:ext>
             </a:extLst>
           </p:cNvPr>
@@ -3523,12 +4561,13 @@
         </p:nvSpPr>
         <p:spPr>
           <a:xfrm>
-            <a:off x="6832873" y="2415394"/>
-            <a:ext cx="1574321" cy="1574321"/>
+            <a:off x="2693009" y="2839520"/>
+            <a:ext cx="671779" cy="579120"/>
           </a:xfrm>
-          <a:prstGeom prst="roundRect">
+          <a:prstGeom prst="hexagon">
             <a:avLst/>
           </a:prstGeom>
+          <a:ln w="31750"/>
         </p:spPr>
         <p:style>
           <a:lnRef idx="2">
@@ -3549,16 +4588,412 @@
           <a:lstStyle/>
           <a:p>
             <a:pPr algn="ctr"/>
-            <a:endParaRPr lang="de-DE"/>
-          </a:p>
-        </p:txBody>
-      </p:sp>
-      <p:sp>
-        <p:nvSpPr>
-          <p:cNvPr id="12" name="TextBox 11">
-            <a:extLst>
-              <a:ext uri="{FF2B5EF4-FFF2-40B4-BE49-F238E27FC236}">
-                <a16:creationId xmlns:a16="http://schemas.microsoft.com/office/drawing/2014/main" id="{BEF8EDFC-919A-4125-B199-602B344277CE}"/>
+            <a:endParaRPr lang="de-DE">
+              <a:solidFill>
+                <a:schemeClr val="dk1"/>
+              </a:solidFill>
+            </a:endParaRPr>
+          </a:p>
+        </p:txBody>
+      </p:sp>
+      <p:sp>
+        <p:nvSpPr>
+          <p:cNvPr id="20" name="Hexagon 19">
+            <a:extLst>
+              <a:ext uri="{FF2B5EF4-FFF2-40B4-BE49-F238E27FC236}">
+                <a16:creationId xmlns:a16="http://schemas.microsoft.com/office/drawing/2014/main" id="{4FE605B8-1661-4682-89A7-9C7C5B6A73AF}"/>
+              </a:ext>
+            </a:extLst>
+          </p:cNvPr>
+          <p:cNvSpPr/>
+          <p:nvPr/>
+        </p:nvSpPr>
+        <p:spPr>
+          <a:xfrm>
+            <a:off x="3549783" y="2366259"/>
+            <a:ext cx="671779" cy="579120"/>
+          </a:xfrm>
+          <a:prstGeom prst="hexagon">
+            <a:avLst/>
+          </a:prstGeom>
+          <a:ln w="31750"/>
+        </p:spPr>
+        <p:style>
+          <a:lnRef idx="2">
+            <a:schemeClr val="dk1"/>
+          </a:lnRef>
+          <a:fillRef idx="1">
+            <a:schemeClr val="lt1"/>
+          </a:fillRef>
+          <a:effectRef idx="0">
+            <a:schemeClr val="dk1"/>
+          </a:effectRef>
+          <a:fontRef idx="minor">
+            <a:schemeClr val="dk1"/>
+          </a:fontRef>
+        </p:style>
+        <p:txBody>
+          <a:bodyPr rtlCol="0" anchor="ctr"/>
+          <a:lstStyle/>
+          <a:p>
+            <a:pPr algn="ctr"/>
+            <a:endParaRPr lang="de-DE">
+              <a:solidFill>
+                <a:schemeClr val="dk1"/>
+              </a:solidFill>
+            </a:endParaRPr>
+          </a:p>
+        </p:txBody>
+      </p:sp>
+      <p:sp>
+        <p:nvSpPr>
+          <p:cNvPr id="22" name="Hexagon 21">
+            <a:extLst>
+              <a:ext uri="{FF2B5EF4-FFF2-40B4-BE49-F238E27FC236}">
+                <a16:creationId xmlns:a16="http://schemas.microsoft.com/office/drawing/2014/main" id="{329D17D3-5DC1-4FA1-A5AC-BC2609C270AF}"/>
+              </a:ext>
+            </a:extLst>
+          </p:cNvPr>
+          <p:cNvSpPr/>
+          <p:nvPr/>
+        </p:nvSpPr>
+        <p:spPr>
+          <a:xfrm>
+            <a:off x="2021230" y="3550520"/>
+            <a:ext cx="671779" cy="579120"/>
+          </a:xfrm>
+          <a:prstGeom prst="hexagon">
+            <a:avLst/>
+          </a:prstGeom>
+          <a:ln w="31750"/>
+        </p:spPr>
+        <p:style>
+          <a:lnRef idx="2">
+            <a:schemeClr val="dk1"/>
+          </a:lnRef>
+          <a:fillRef idx="1">
+            <a:schemeClr val="lt1"/>
+          </a:fillRef>
+          <a:effectRef idx="0">
+            <a:schemeClr val="dk1"/>
+          </a:effectRef>
+          <a:fontRef idx="minor">
+            <a:schemeClr val="dk1"/>
+          </a:fontRef>
+        </p:style>
+        <p:txBody>
+          <a:bodyPr rtlCol="0" anchor="ctr"/>
+          <a:lstStyle/>
+          <a:p>
+            <a:pPr algn="ctr"/>
+            <a:endParaRPr lang="de-DE">
+              <a:solidFill>
+                <a:schemeClr val="dk1"/>
+              </a:solidFill>
+            </a:endParaRPr>
+          </a:p>
+        </p:txBody>
+      </p:sp>
+      <p:sp>
+        <p:nvSpPr>
+          <p:cNvPr id="24" name="Hexagon 23">
+            <a:extLst>
+              <a:ext uri="{FF2B5EF4-FFF2-40B4-BE49-F238E27FC236}">
+                <a16:creationId xmlns:a16="http://schemas.microsoft.com/office/drawing/2014/main" id="{097132A8-9ECE-44CB-AC05-6F19A61596B0}"/>
+              </a:ext>
+            </a:extLst>
+          </p:cNvPr>
+          <p:cNvSpPr/>
+          <p:nvPr/>
+        </p:nvSpPr>
+        <p:spPr>
+          <a:xfrm>
+            <a:off x="5114219" y="2255320"/>
+            <a:ext cx="671779" cy="579120"/>
+          </a:xfrm>
+          <a:prstGeom prst="hexagon">
+            <a:avLst/>
+          </a:prstGeom>
+          <a:ln w="31750"/>
+        </p:spPr>
+        <p:style>
+          <a:lnRef idx="2">
+            <a:schemeClr val="dk1"/>
+          </a:lnRef>
+          <a:fillRef idx="1">
+            <a:schemeClr val="lt1"/>
+          </a:fillRef>
+          <a:effectRef idx="0">
+            <a:schemeClr val="dk1"/>
+          </a:effectRef>
+          <a:fontRef idx="minor">
+            <a:schemeClr val="dk1"/>
+          </a:fontRef>
+        </p:style>
+        <p:txBody>
+          <a:bodyPr rtlCol="0" anchor="ctr"/>
+          <a:lstStyle/>
+          <a:p>
+            <a:pPr algn="ctr"/>
+            <a:endParaRPr lang="de-DE">
+              <a:solidFill>
+                <a:schemeClr val="dk1"/>
+              </a:solidFill>
+            </a:endParaRPr>
+          </a:p>
+        </p:txBody>
+      </p:sp>
+      <p:sp>
+        <p:nvSpPr>
+          <p:cNvPr id="26" name="Hexagon 25">
+            <a:extLst>
+              <a:ext uri="{FF2B5EF4-FFF2-40B4-BE49-F238E27FC236}">
+                <a16:creationId xmlns:a16="http://schemas.microsoft.com/office/drawing/2014/main" id="{9F58B038-B455-48E3-8DD0-C9B1BA1CCD83}"/>
+              </a:ext>
+            </a:extLst>
+          </p:cNvPr>
+          <p:cNvSpPr/>
+          <p:nvPr/>
+        </p:nvSpPr>
+        <p:spPr>
+          <a:xfrm>
+            <a:off x="5876219" y="3108560"/>
+            <a:ext cx="671779" cy="579120"/>
+          </a:xfrm>
+          <a:prstGeom prst="hexagon">
+            <a:avLst/>
+          </a:prstGeom>
+          <a:ln w="31750"/>
+        </p:spPr>
+        <p:style>
+          <a:lnRef idx="2">
+            <a:schemeClr val="dk1"/>
+          </a:lnRef>
+          <a:fillRef idx="1">
+            <a:schemeClr val="lt1"/>
+          </a:fillRef>
+          <a:effectRef idx="0">
+            <a:schemeClr val="dk1"/>
+          </a:effectRef>
+          <a:fontRef idx="minor">
+            <a:schemeClr val="dk1"/>
+          </a:fontRef>
+        </p:style>
+        <p:txBody>
+          <a:bodyPr rtlCol="0" anchor="ctr"/>
+          <a:lstStyle/>
+          <a:p>
+            <a:pPr algn="ctr"/>
+            <a:endParaRPr lang="de-DE">
+              <a:solidFill>
+                <a:schemeClr val="dk1"/>
+              </a:solidFill>
+            </a:endParaRPr>
+          </a:p>
+        </p:txBody>
+      </p:sp>
+      <p:sp>
+        <p:nvSpPr>
+          <p:cNvPr id="28" name="Hexagon 27">
+            <a:extLst>
+              <a:ext uri="{FF2B5EF4-FFF2-40B4-BE49-F238E27FC236}">
+                <a16:creationId xmlns:a16="http://schemas.microsoft.com/office/drawing/2014/main" id="{BEFCFC24-CDF3-43F6-A20C-CFBF9587818C}"/>
+              </a:ext>
+            </a:extLst>
+          </p:cNvPr>
+          <p:cNvSpPr/>
+          <p:nvPr/>
+        </p:nvSpPr>
+        <p:spPr>
+          <a:xfrm>
+            <a:off x="4281870" y="2894380"/>
+            <a:ext cx="671779" cy="579120"/>
+          </a:xfrm>
+          <a:prstGeom prst="hexagon">
+            <a:avLst/>
+          </a:prstGeom>
+          <a:ln w="31750"/>
+        </p:spPr>
+        <p:style>
+          <a:lnRef idx="2">
+            <a:schemeClr val="dk1"/>
+          </a:lnRef>
+          <a:fillRef idx="1">
+            <a:schemeClr val="lt1"/>
+          </a:fillRef>
+          <a:effectRef idx="0">
+            <a:schemeClr val="dk1"/>
+          </a:effectRef>
+          <a:fontRef idx="minor">
+            <a:schemeClr val="dk1"/>
+          </a:fontRef>
+        </p:style>
+        <p:txBody>
+          <a:bodyPr rtlCol="0" anchor="ctr"/>
+          <a:lstStyle/>
+          <a:p>
+            <a:pPr algn="ctr"/>
+            <a:endParaRPr lang="de-DE">
+              <a:solidFill>
+                <a:schemeClr val="dk1"/>
+              </a:solidFill>
+            </a:endParaRPr>
+          </a:p>
+        </p:txBody>
+      </p:sp>
+      <p:sp>
+        <p:nvSpPr>
+          <p:cNvPr id="30" name="Hexagon 29">
+            <a:extLst>
+              <a:ext uri="{FF2B5EF4-FFF2-40B4-BE49-F238E27FC236}">
+                <a16:creationId xmlns:a16="http://schemas.microsoft.com/office/drawing/2014/main" id="{73908BE8-7FE4-4DFD-BA73-65817045C7B4}"/>
+              </a:ext>
+            </a:extLst>
+          </p:cNvPr>
+          <p:cNvSpPr/>
+          <p:nvPr/>
+        </p:nvSpPr>
+        <p:spPr>
+          <a:xfrm>
+            <a:off x="5014874" y="3583224"/>
+            <a:ext cx="671779" cy="579120"/>
+          </a:xfrm>
+          <a:prstGeom prst="hexagon">
+            <a:avLst/>
+          </a:prstGeom>
+          <a:ln w="31750"/>
+        </p:spPr>
+        <p:style>
+          <a:lnRef idx="2">
+            <a:schemeClr val="dk1"/>
+          </a:lnRef>
+          <a:fillRef idx="1">
+            <a:schemeClr val="lt1"/>
+          </a:fillRef>
+          <a:effectRef idx="0">
+            <a:schemeClr val="dk1"/>
+          </a:effectRef>
+          <a:fontRef idx="minor">
+            <a:schemeClr val="dk1"/>
+          </a:fontRef>
+        </p:style>
+        <p:txBody>
+          <a:bodyPr rtlCol="0" anchor="ctr"/>
+          <a:lstStyle/>
+          <a:p>
+            <a:pPr algn="ctr"/>
+            <a:endParaRPr lang="de-DE">
+              <a:solidFill>
+                <a:schemeClr val="dk1"/>
+              </a:solidFill>
+            </a:endParaRPr>
+          </a:p>
+        </p:txBody>
+      </p:sp>
+      <p:sp>
+        <p:nvSpPr>
+          <p:cNvPr id="32" name="Hexagon 31">
+            <a:extLst>
+              <a:ext uri="{FF2B5EF4-FFF2-40B4-BE49-F238E27FC236}">
+                <a16:creationId xmlns:a16="http://schemas.microsoft.com/office/drawing/2014/main" id="{07BE770E-6524-4461-A666-26B61E8C89C1}"/>
+              </a:ext>
+            </a:extLst>
+          </p:cNvPr>
+          <p:cNvSpPr/>
+          <p:nvPr/>
+        </p:nvSpPr>
+        <p:spPr>
+          <a:xfrm>
+            <a:off x="6406004" y="2076699"/>
+            <a:ext cx="671779" cy="579120"/>
+          </a:xfrm>
+          <a:prstGeom prst="hexagon">
+            <a:avLst/>
+          </a:prstGeom>
+          <a:ln w="31750"/>
+        </p:spPr>
+        <p:style>
+          <a:lnRef idx="2">
+            <a:schemeClr val="dk1"/>
+          </a:lnRef>
+          <a:fillRef idx="1">
+            <a:schemeClr val="lt1"/>
+          </a:fillRef>
+          <a:effectRef idx="0">
+            <a:schemeClr val="dk1"/>
+          </a:effectRef>
+          <a:fontRef idx="minor">
+            <a:schemeClr val="dk1"/>
+          </a:fontRef>
+        </p:style>
+        <p:txBody>
+          <a:bodyPr rtlCol="0" anchor="ctr"/>
+          <a:lstStyle/>
+          <a:p>
+            <a:pPr algn="ctr"/>
+            <a:endParaRPr lang="de-DE">
+              <a:solidFill>
+                <a:schemeClr val="dk1"/>
+              </a:solidFill>
+            </a:endParaRPr>
+          </a:p>
+        </p:txBody>
+      </p:sp>
+      <p:sp>
+        <p:nvSpPr>
+          <p:cNvPr id="34" name="Hexagon 33">
+            <a:extLst>
+              <a:ext uri="{FF2B5EF4-FFF2-40B4-BE49-F238E27FC236}">
+                <a16:creationId xmlns:a16="http://schemas.microsoft.com/office/drawing/2014/main" id="{055A178E-2840-4D36-88C7-C7C2E9DE35B6}"/>
+              </a:ext>
+            </a:extLst>
+          </p:cNvPr>
+          <p:cNvSpPr/>
+          <p:nvPr/>
+        </p:nvSpPr>
+        <p:spPr>
+          <a:xfrm>
+            <a:off x="7224165" y="2798480"/>
+            <a:ext cx="671779" cy="579120"/>
+          </a:xfrm>
+          <a:prstGeom prst="hexagon">
+            <a:avLst/>
+          </a:prstGeom>
+          <a:ln w="31750"/>
+        </p:spPr>
+        <p:style>
+          <a:lnRef idx="2">
+            <a:schemeClr val="dk1"/>
+          </a:lnRef>
+          <a:fillRef idx="1">
+            <a:schemeClr val="lt1"/>
+          </a:fillRef>
+          <a:effectRef idx="0">
+            <a:schemeClr val="dk1"/>
+          </a:effectRef>
+          <a:fontRef idx="minor">
+            <a:schemeClr val="dk1"/>
+          </a:fontRef>
+        </p:style>
+        <p:txBody>
+          <a:bodyPr rtlCol="0" anchor="ctr"/>
+          <a:lstStyle/>
+          <a:p>
+            <a:pPr algn="ctr"/>
+            <a:endParaRPr lang="de-DE">
+              <a:solidFill>
+                <a:schemeClr val="dk1"/>
+              </a:solidFill>
+            </a:endParaRPr>
+          </a:p>
+        </p:txBody>
+      </p:sp>
+      <p:sp>
+        <p:nvSpPr>
+          <p:cNvPr id="36" name="TextBox 35">
+            <a:extLst>
+              <a:ext uri="{FF2B5EF4-FFF2-40B4-BE49-F238E27FC236}">
+                <a16:creationId xmlns:a16="http://schemas.microsoft.com/office/drawing/2014/main" id="{FD48B1D3-2362-41B2-940F-88C7879370BA}"/>
               </a:ext>
             </a:extLst>
           </p:cNvPr>
@@ -3567,8 +5002,8 @@
         </p:nvSpPr>
         <p:spPr>
           <a:xfrm>
-            <a:off x="3472126" y="3989715"/>
-            <a:ext cx="513282" cy="369332"/>
+            <a:off x="2878328" y="4199411"/>
+            <a:ext cx="1770406" cy="369332"/>
           </a:xfrm>
           <a:prstGeom prst="rect">
             <a:avLst/>
@@ -3576,24 +5011,295 @@
           <a:noFill/>
         </p:spPr>
         <p:txBody>
-          <a:bodyPr wrap="none" rtlCol="0">
+          <a:bodyPr wrap="square" rtlCol="0">
             <a:spAutoFit/>
           </a:bodyPr>
           <a:lstStyle/>
           <a:p>
+            <a:pPr algn="ctr"/>
             <a:r>
               <a:rPr lang="de-DE" dirty="0"/>
-              <a:t>VM</a:t>
-            </a:r>
-          </a:p>
-        </p:txBody>
-      </p:sp>
-      <p:sp>
-        <p:nvSpPr>
-          <p:cNvPr id="14" name="TextBox 13">
-            <a:extLst>
-              <a:ext uri="{FF2B5EF4-FFF2-40B4-BE49-F238E27FC236}">
-                <a16:creationId xmlns:a16="http://schemas.microsoft.com/office/drawing/2014/main" id="{3FAB99C5-6638-4216-8D6B-C34CED88CB2D}"/>
+              <a:t>Viele Container</a:t>
+            </a:r>
+          </a:p>
+        </p:txBody>
+      </p:sp>
+      <p:cxnSp>
+        <p:nvCxnSpPr>
+          <p:cNvPr id="38" name="Straight Arrow Connector 37">
+            <a:extLst>
+              <a:ext uri="{FF2B5EF4-FFF2-40B4-BE49-F238E27FC236}">
+                <a16:creationId xmlns:a16="http://schemas.microsoft.com/office/drawing/2014/main" id="{A608D3CE-3558-4C30-9723-2DF4B3302EC2}"/>
+              </a:ext>
+            </a:extLst>
+          </p:cNvPr>
+          <p:cNvCxnSpPr>
+            <a:cxnSpLocks/>
+          </p:cNvCxnSpPr>
+          <p:nvPr/>
+        </p:nvCxnSpPr>
+        <p:spPr>
+          <a:xfrm flipH="1" flipV="1">
+            <a:off x="2878328" y="3896909"/>
+            <a:ext cx="869853" cy="258625"/>
+          </a:xfrm>
+          <a:prstGeom prst="straightConnector1">
+            <a:avLst/>
+          </a:prstGeom>
+          <a:ln w="19050">
+            <a:solidFill>
+              <a:schemeClr val="tx1"/>
+            </a:solidFill>
+            <a:prstDash val="dash"/>
+            <a:tailEnd type="triangle" w="lg" len="lg"/>
+          </a:ln>
+        </p:spPr>
+        <p:style>
+          <a:lnRef idx="1">
+            <a:schemeClr val="accent1"/>
+          </a:lnRef>
+          <a:fillRef idx="0">
+            <a:schemeClr val="accent1"/>
+          </a:fillRef>
+          <a:effectRef idx="0">
+            <a:schemeClr val="accent1"/>
+          </a:effectRef>
+          <a:fontRef idx="minor">
+            <a:schemeClr val="tx1"/>
+          </a:fontRef>
+        </p:style>
+      </p:cxnSp>
+      <p:cxnSp>
+        <p:nvCxnSpPr>
+          <p:cNvPr id="42" name="Straight Arrow Connector 41">
+            <a:extLst>
+              <a:ext uri="{FF2B5EF4-FFF2-40B4-BE49-F238E27FC236}">
+                <a16:creationId xmlns:a16="http://schemas.microsoft.com/office/drawing/2014/main" id="{EA220D88-2449-4D0E-A5B5-B1EF9426C394}"/>
+              </a:ext>
+            </a:extLst>
+          </p:cNvPr>
+          <p:cNvCxnSpPr>
+            <a:cxnSpLocks/>
+          </p:cNvCxnSpPr>
+          <p:nvPr/>
+        </p:nvCxnSpPr>
+        <p:spPr>
+          <a:xfrm flipH="1" flipV="1">
+            <a:off x="3313254" y="3519283"/>
+            <a:ext cx="434927" cy="636251"/>
+          </a:xfrm>
+          <a:prstGeom prst="straightConnector1">
+            <a:avLst/>
+          </a:prstGeom>
+          <a:ln w="19050">
+            <a:solidFill>
+              <a:schemeClr val="tx1"/>
+            </a:solidFill>
+            <a:prstDash val="dash"/>
+            <a:tailEnd type="triangle" w="lg" len="lg"/>
+          </a:ln>
+        </p:spPr>
+        <p:style>
+          <a:lnRef idx="1">
+            <a:schemeClr val="accent1"/>
+          </a:lnRef>
+          <a:fillRef idx="0">
+            <a:schemeClr val="accent1"/>
+          </a:fillRef>
+          <a:effectRef idx="0">
+            <a:schemeClr val="accent1"/>
+          </a:effectRef>
+          <a:fontRef idx="minor">
+            <a:schemeClr val="tx1"/>
+          </a:fontRef>
+        </p:style>
+      </p:cxnSp>
+      <p:cxnSp>
+        <p:nvCxnSpPr>
+          <p:cNvPr id="46" name="Straight Arrow Connector 45">
+            <a:extLst>
+              <a:ext uri="{FF2B5EF4-FFF2-40B4-BE49-F238E27FC236}">
+                <a16:creationId xmlns:a16="http://schemas.microsoft.com/office/drawing/2014/main" id="{F9509CAE-F6AC-41AC-B75F-54699B93E9E9}"/>
+              </a:ext>
+            </a:extLst>
+          </p:cNvPr>
+          <p:cNvCxnSpPr>
+            <a:cxnSpLocks/>
+          </p:cNvCxnSpPr>
+          <p:nvPr/>
+        </p:nvCxnSpPr>
+        <p:spPr>
+          <a:xfrm flipV="1">
+            <a:off x="3733393" y="3144488"/>
+            <a:ext cx="83594" cy="994344"/>
+          </a:xfrm>
+          <a:prstGeom prst="straightConnector1">
+            <a:avLst/>
+          </a:prstGeom>
+          <a:ln w="19050">
+            <a:solidFill>
+              <a:schemeClr val="tx1"/>
+            </a:solidFill>
+            <a:prstDash val="dash"/>
+            <a:tailEnd type="triangle" w="lg" len="lg"/>
+          </a:ln>
+        </p:spPr>
+        <p:style>
+          <a:lnRef idx="1">
+            <a:schemeClr val="accent1"/>
+          </a:lnRef>
+          <a:fillRef idx="0">
+            <a:schemeClr val="accent1"/>
+          </a:fillRef>
+          <a:effectRef idx="0">
+            <a:schemeClr val="accent1"/>
+          </a:effectRef>
+          <a:fontRef idx="minor">
+            <a:schemeClr val="tx1"/>
+          </a:fontRef>
+        </p:style>
+      </p:cxnSp>
+      <p:cxnSp>
+        <p:nvCxnSpPr>
+          <p:cNvPr id="50" name="Straight Arrow Connector 49">
+            <a:extLst>
+              <a:ext uri="{FF2B5EF4-FFF2-40B4-BE49-F238E27FC236}">
+                <a16:creationId xmlns:a16="http://schemas.microsoft.com/office/drawing/2014/main" id="{E5340632-71EF-478B-BCBF-6530D4C9D0AF}"/>
+              </a:ext>
+            </a:extLst>
+          </p:cNvPr>
+          <p:cNvCxnSpPr>
+            <a:cxnSpLocks/>
+          </p:cNvCxnSpPr>
+          <p:nvPr/>
+        </p:nvCxnSpPr>
+        <p:spPr>
+          <a:xfrm flipV="1">
+            <a:off x="3699763" y="3550520"/>
+            <a:ext cx="581356" cy="605014"/>
+          </a:xfrm>
+          <a:prstGeom prst="straightConnector1">
+            <a:avLst/>
+          </a:prstGeom>
+          <a:ln w="19050">
+            <a:solidFill>
+              <a:schemeClr val="tx1"/>
+            </a:solidFill>
+            <a:prstDash val="dash"/>
+            <a:tailEnd type="triangle" w="lg" len="lg"/>
+          </a:ln>
+        </p:spPr>
+        <p:style>
+          <a:lnRef idx="1">
+            <a:schemeClr val="accent1"/>
+          </a:lnRef>
+          <a:fillRef idx="0">
+            <a:schemeClr val="accent1"/>
+          </a:fillRef>
+          <a:effectRef idx="0">
+            <a:schemeClr val="accent1"/>
+          </a:effectRef>
+          <a:fontRef idx="minor">
+            <a:schemeClr val="tx1"/>
+          </a:fontRef>
+        </p:style>
+      </p:cxnSp>
+      <p:cxnSp>
+        <p:nvCxnSpPr>
+          <p:cNvPr id="54" name="Straight Arrow Connector 53">
+            <a:extLst>
+              <a:ext uri="{FF2B5EF4-FFF2-40B4-BE49-F238E27FC236}">
+                <a16:creationId xmlns:a16="http://schemas.microsoft.com/office/drawing/2014/main" id="{24DD77B4-E039-4353-8A55-91F3F21208A2}"/>
+              </a:ext>
+            </a:extLst>
+          </p:cNvPr>
+          <p:cNvCxnSpPr>
+            <a:cxnSpLocks/>
+          </p:cNvCxnSpPr>
+          <p:nvPr/>
+        </p:nvCxnSpPr>
+        <p:spPr>
+          <a:xfrm flipV="1">
+            <a:off x="3758375" y="3853027"/>
+            <a:ext cx="1116739" cy="285805"/>
+          </a:xfrm>
+          <a:prstGeom prst="straightConnector1">
+            <a:avLst/>
+          </a:prstGeom>
+          <a:ln w="19050">
+            <a:solidFill>
+              <a:schemeClr val="tx1"/>
+            </a:solidFill>
+            <a:prstDash val="dash"/>
+            <a:tailEnd type="triangle" w="lg" len="lg"/>
+          </a:ln>
+        </p:spPr>
+        <p:style>
+          <a:lnRef idx="1">
+            <a:schemeClr val="accent1"/>
+          </a:lnRef>
+          <a:fillRef idx="0">
+            <a:schemeClr val="accent1"/>
+          </a:fillRef>
+          <a:effectRef idx="0">
+            <a:schemeClr val="accent1"/>
+          </a:effectRef>
+          <a:fontRef idx="minor">
+            <a:schemeClr val="tx1"/>
+          </a:fontRef>
+        </p:style>
+      </p:cxnSp>
+      <p:cxnSp>
+        <p:nvCxnSpPr>
+          <p:cNvPr id="58" name="Straight Arrow Connector 57">
+            <a:extLst>
+              <a:ext uri="{FF2B5EF4-FFF2-40B4-BE49-F238E27FC236}">
+                <a16:creationId xmlns:a16="http://schemas.microsoft.com/office/drawing/2014/main" id="{9D53C229-23BA-44D7-9984-093962A50277}"/>
+              </a:ext>
+            </a:extLst>
+          </p:cNvPr>
+          <p:cNvCxnSpPr>
+            <a:cxnSpLocks/>
+          </p:cNvCxnSpPr>
+          <p:nvPr/>
+        </p:nvCxnSpPr>
+        <p:spPr>
+          <a:xfrm flipH="1" flipV="1">
+            <a:off x="5384708" y="5194129"/>
+            <a:ext cx="2953557" cy="822910"/>
+          </a:xfrm>
+          <a:prstGeom prst="straightConnector1">
+            <a:avLst/>
+          </a:prstGeom>
+          <a:ln w="19050">
+            <a:solidFill>
+              <a:schemeClr val="tx1"/>
+            </a:solidFill>
+            <a:prstDash val="dash"/>
+            <a:tailEnd type="triangle" w="lg" len="lg"/>
+          </a:ln>
+        </p:spPr>
+        <p:style>
+          <a:lnRef idx="1">
+            <a:schemeClr val="accent1"/>
+          </a:lnRef>
+          <a:fillRef idx="0">
+            <a:schemeClr val="accent1"/>
+          </a:fillRef>
+          <a:effectRef idx="0">
+            <a:schemeClr val="accent1"/>
+          </a:effectRef>
+          <a:fontRef idx="minor">
+            <a:schemeClr val="tx1"/>
+          </a:fontRef>
+        </p:style>
+      </p:cxnSp>
+      <p:sp>
+        <p:nvSpPr>
+          <p:cNvPr id="60" name="TextBox 59">
+            <a:extLst>
+              <a:ext uri="{FF2B5EF4-FFF2-40B4-BE49-F238E27FC236}">
+                <a16:creationId xmlns:a16="http://schemas.microsoft.com/office/drawing/2014/main" id="{DC1CBD08-A3C0-4CAC-AA0F-086BA699D7F9}"/>
               </a:ext>
             </a:extLst>
           </p:cNvPr>
@@ -3602,8 +5308,8 @@
         </p:nvSpPr>
         <p:spPr>
           <a:xfrm>
-            <a:off x="5417759" y="3989715"/>
-            <a:ext cx="513282" cy="369332"/>
+            <a:off x="8518652" y="5798651"/>
+            <a:ext cx="1690527" cy="369332"/>
           </a:xfrm>
           <a:prstGeom prst="rect">
             <a:avLst/>
@@ -3618,419 +5324,15 @@
           <a:p>
             <a:r>
               <a:rPr lang="de-DE" dirty="0"/>
-              <a:t>VM</a:t>
-            </a:r>
-          </a:p>
-        </p:txBody>
-      </p:sp>
-      <p:sp>
-        <p:nvSpPr>
-          <p:cNvPr id="16" name="TextBox 15">
-            <a:extLst>
-              <a:ext uri="{FF2B5EF4-FFF2-40B4-BE49-F238E27FC236}">
-                <a16:creationId xmlns:a16="http://schemas.microsoft.com/office/drawing/2014/main" id="{6F8E5591-EF40-45FB-BE44-B62611FF91A3}"/>
-              </a:ext>
-            </a:extLst>
-          </p:cNvPr>
-          <p:cNvSpPr txBox="1"/>
-          <p:nvPr/>
-        </p:nvSpPr>
-        <p:spPr>
-          <a:xfrm>
-            <a:off x="7455032" y="3992424"/>
-            <a:ext cx="513282" cy="369332"/>
-          </a:xfrm>
-          <a:prstGeom prst="rect">
-            <a:avLst/>
-          </a:prstGeom>
-          <a:noFill/>
-        </p:spPr>
-        <p:txBody>
-          <a:bodyPr wrap="none" rtlCol="0">
-            <a:spAutoFit/>
-          </a:bodyPr>
-          <a:lstStyle/>
-          <a:p>
-            <a:r>
-              <a:rPr lang="de-DE" dirty="0"/>
-              <a:t>VM</a:t>
-            </a:r>
-          </a:p>
-        </p:txBody>
-      </p:sp>
-      <p:sp>
-        <p:nvSpPr>
-          <p:cNvPr id="17" name="TextBox 16">
-            <a:extLst>
-              <a:ext uri="{FF2B5EF4-FFF2-40B4-BE49-F238E27FC236}">
-                <a16:creationId xmlns:a16="http://schemas.microsoft.com/office/drawing/2014/main" id="{A56CEF10-6B50-4BC9-8434-E3E65AF1DF5D}"/>
-              </a:ext>
-            </a:extLst>
-          </p:cNvPr>
-          <p:cNvSpPr txBox="1"/>
-          <p:nvPr/>
-        </p:nvSpPr>
-        <p:spPr>
-          <a:xfrm>
-            <a:off x="3083788" y="3509042"/>
-            <a:ext cx="1351909" cy="369332"/>
-          </a:xfrm>
-          <a:prstGeom prst="rect">
-            <a:avLst/>
-          </a:prstGeom>
-          <a:noFill/>
-        </p:spPr>
-        <p:txBody>
-          <a:bodyPr wrap="none" rtlCol="0">
-            <a:spAutoFit/>
-          </a:bodyPr>
-          <a:lstStyle/>
-          <a:p>
-            <a:r>
-              <a:rPr lang="de-DE" dirty="0"/>
-              <a:t>Windows XP</a:t>
-            </a:r>
-          </a:p>
-        </p:txBody>
-      </p:sp>
-      <p:sp>
-        <p:nvSpPr>
-          <p:cNvPr id="19" name="TextBox 18">
-            <a:extLst>
-              <a:ext uri="{FF2B5EF4-FFF2-40B4-BE49-F238E27FC236}">
-                <a16:creationId xmlns:a16="http://schemas.microsoft.com/office/drawing/2014/main" id="{2C91A0C7-7DA9-4B2C-8664-833463195BBC}"/>
-              </a:ext>
-            </a:extLst>
-          </p:cNvPr>
-          <p:cNvSpPr txBox="1"/>
-          <p:nvPr/>
-        </p:nvSpPr>
-        <p:spPr>
-          <a:xfrm>
-            <a:off x="4968892" y="3509042"/>
-            <a:ext cx="1472967" cy="369332"/>
-          </a:xfrm>
-          <a:prstGeom prst="rect">
-            <a:avLst/>
-          </a:prstGeom>
-          <a:noFill/>
-        </p:spPr>
-        <p:txBody>
-          <a:bodyPr wrap="none" rtlCol="0">
-            <a:spAutoFit/>
-          </a:bodyPr>
-          <a:lstStyle/>
-          <a:p>
-            <a:r>
-              <a:rPr lang="de-DE" dirty="0"/>
-              <a:t>Ubuntu 16.04</a:t>
-            </a:r>
-          </a:p>
-        </p:txBody>
-      </p:sp>
-      <p:sp>
-        <p:nvSpPr>
-          <p:cNvPr id="21" name="TextBox 20">
-            <a:extLst>
-              <a:ext uri="{FF2B5EF4-FFF2-40B4-BE49-F238E27FC236}">
-                <a16:creationId xmlns:a16="http://schemas.microsoft.com/office/drawing/2014/main" id="{F4A4EF2B-B381-4EED-8ED5-0CA9799ABAAD}"/>
-              </a:ext>
-            </a:extLst>
-          </p:cNvPr>
-          <p:cNvSpPr txBox="1"/>
-          <p:nvPr/>
-        </p:nvSpPr>
-        <p:spPr>
-          <a:xfrm>
-            <a:off x="7004993" y="3465356"/>
-            <a:ext cx="1230080" cy="369332"/>
-          </a:xfrm>
-          <a:prstGeom prst="rect">
-            <a:avLst/>
-          </a:prstGeom>
-          <a:noFill/>
-        </p:spPr>
-        <p:txBody>
-          <a:bodyPr wrap="none" rtlCol="0">
-            <a:spAutoFit/>
-          </a:bodyPr>
-          <a:lstStyle/>
-          <a:p>
-            <a:r>
-              <a:rPr lang="de-DE" dirty="0"/>
-              <a:t>Windows 8</a:t>
-            </a:r>
-          </a:p>
-        </p:txBody>
-      </p:sp>
-      <p:sp>
-        <p:nvSpPr>
-          <p:cNvPr id="22" name="TextBox 21">
-            <a:extLst>
-              <a:ext uri="{FF2B5EF4-FFF2-40B4-BE49-F238E27FC236}">
-                <a16:creationId xmlns:a16="http://schemas.microsoft.com/office/drawing/2014/main" id="{1069D579-72F0-4F6B-8B28-8C6F36E50525}"/>
-              </a:ext>
-            </a:extLst>
-          </p:cNvPr>
-          <p:cNvSpPr txBox="1"/>
-          <p:nvPr/>
-        </p:nvSpPr>
-        <p:spPr>
-          <a:xfrm>
-            <a:off x="3332569" y="2026902"/>
-            <a:ext cx="792396" cy="369332"/>
-          </a:xfrm>
-          <a:prstGeom prst="rect">
-            <a:avLst/>
-          </a:prstGeom>
-          <a:noFill/>
-        </p:spPr>
-        <p:txBody>
-          <a:bodyPr wrap="none" rtlCol="0">
-            <a:spAutoFit/>
-          </a:bodyPr>
-          <a:lstStyle/>
-          <a:p>
-            <a:r>
-              <a:rPr lang="de-DE" dirty="0"/>
-              <a:t>1 Core</a:t>
-            </a:r>
-          </a:p>
-        </p:txBody>
-      </p:sp>
-      <p:sp>
-        <p:nvSpPr>
-          <p:cNvPr id="24" name="TextBox 23">
-            <a:extLst>
-              <a:ext uri="{FF2B5EF4-FFF2-40B4-BE49-F238E27FC236}">
-                <a16:creationId xmlns:a16="http://schemas.microsoft.com/office/drawing/2014/main" id="{4336B11D-BA48-49E1-B422-CD016BC1351C}"/>
-              </a:ext>
-            </a:extLst>
-          </p:cNvPr>
-          <p:cNvSpPr txBox="1"/>
-          <p:nvPr/>
-        </p:nvSpPr>
-        <p:spPr>
-          <a:xfrm>
-            <a:off x="5309177" y="1990392"/>
-            <a:ext cx="792396" cy="369332"/>
-          </a:xfrm>
-          <a:prstGeom prst="rect">
-            <a:avLst/>
-          </a:prstGeom>
-          <a:noFill/>
-        </p:spPr>
-        <p:txBody>
-          <a:bodyPr wrap="none" rtlCol="0">
-            <a:spAutoFit/>
-          </a:bodyPr>
-          <a:lstStyle/>
-          <a:p>
-            <a:r>
-              <a:rPr lang="de-DE" dirty="0"/>
-              <a:t>1 Core</a:t>
-            </a:r>
-          </a:p>
-        </p:txBody>
-      </p:sp>
-      <p:sp>
-        <p:nvSpPr>
-          <p:cNvPr id="26" name="TextBox 25">
-            <a:extLst>
-              <a:ext uri="{FF2B5EF4-FFF2-40B4-BE49-F238E27FC236}">
-                <a16:creationId xmlns:a16="http://schemas.microsoft.com/office/drawing/2014/main" id="{B2B57768-D469-4E77-A5FD-0223B567657A}"/>
-              </a:ext>
-            </a:extLst>
-          </p:cNvPr>
-          <p:cNvSpPr txBox="1"/>
-          <p:nvPr/>
-        </p:nvSpPr>
-        <p:spPr>
-          <a:xfrm>
-            <a:off x="7191259" y="1990392"/>
-            <a:ext cx="792396" cy="369332"/>
-          </a:xfrm>
-          <a:prstGeom prst="rect">
-            <a:avLst/>
-          </a:prstGeom>
-          <a:noFill/>
-        </p:spPr>
-        <p:txBody>
-          <a:bodyPr wrap="none" rtlCol="0">
-            <a:spAutoFit/>
-          </a:bodyPr>
-          <a:lstStyle/>
-          <a:p>
-            <a:r>
-              <a:rPr lang="de-DE" dirty="0"/>
-              <a:t>2 Core</a:t>
-            </a:r>
-          </a:p>
-        </p:txBody>
-      </p:sp>
-      <p:sp>
-        <p:nvSpPr>
-          <p:cNvPr id="28" name="TextBox 27">
-            <a:extLst>
-              <a:ext uri="{FF2B5EF4-FFF2-40B4-BE49-F238E27FC236}">
-                <a16:creationId xmlns:a16="http://schemas.microsoft.com/office/drawing/2014/main" id="{87B67EE2-0810-4E94-8C32-E1E3121FE755}"/>
-              </a:ext>
-            </a:extLst>
-          </p:cNvPr>
-          <p:cNvSpPr txBox="1"/>
-          <p:nvPr/>
-        </p:nvSpPr>
-        <p:spPr>
-          <a:xfrm>
-            <a:off x="5278202" y="4898697"/>
-            <a:ext cx="792396" cy="369332"/>
-          </a:xfrm>
-          <a:prstGeom prst="rect">
-            <a:avLst/>
-          </a:prstGeom>
-          <a:noFill/>
-        </p:spPr>
-        <p:txBody>
-          <a:bodyPr wrap="none" rtlCol="0">
-            <a:spAutoFit/>
-          </a:bodyPr>
-          <a:lstStyle/>
-          <a:p>
-            <a:r>
-              <a:rPr lang="de-DE" dirty="0"/>
-              <a:t>2 Core</a:t>
-            </a:r>
-          </a:p>
-        </p:txBody>
-      </p:sp>
-      <p:sp>
-        <p:nvSpPr>
-          <p:cNvPr id="29" name="Right Brace 28">
-            <a:extLst>
-              <a:ext uri="{FF2B5EF4-FFF2-40B4-BE49-F238E27FC236}">
-                <a16:creationId xmlns:a16="http://schemas.microsoft.com/office/drawing/2014/main" id="{9E616521-5062-4486-820D-EFDFA2CE1787}"/>
-              </a:ext>
-            </a:extLst>
-          </p:cNvPr>
-          <p:cNvSpPr/>
-          <p:nvPr/>
-        </p:nvSpPr>
-        <p:spPr>
-          <a:xfrm>
-            <a:off x="9783704" y="2219696"/>
-            <a:ext cx="175783" cy="2139351"/>
-          </a:xfrm>
-          <a:prstGeom prst="rightBrace">
-            <a:avLst/>
-          </a:prstGeom>
-        </p:spPr>
-        <p:style>
-          <a:lnRef idx="1">
-            <a:schemeClr val="dk1"/>
-          </a:lnRef>
-          <a:fillRef idx="0">
-            <a:schemeClr val="dk1"/>
-          </a:fillRef>
-          <a:effectRef idx="0">
-            <a:schemeClr val="dk1"/>
-          </a:effectRef>
-          <a:fontRef idx="minor">
-            <a:schemeClr val="tx1"/>
-          </a:fontRef>
-        </p:style>
-        <p:txBody>
-          <a:bodyPr rtlCol="0" anchor="ctr"/>
-          <a:lstStyle/>
-          <a:p>
-            <a:pPr algn="ctr"/>
-            <a:endParaRPr lang="de-DE"/>
-          </a:p>
-        </p:txBody>
-      </p:sp>
-      <p:sp>
-        <p:nvSpPr>
-          <p:cNvPr id="31" name="TextBox 30">
-            <a:extLst>
-              <a:ext uri="{FF2B5EF4-FFF2-40B4-BE49-F238E27FC236}">
-                <a16:creationId xmlns:a16="http://schemas.microsoft.com/office/drawing/2014/main" id="{DC608E85-0EDE-46E6-ADAC-639C86B446D8}"/>
-              </a:ext>
-            </a:extLst>
-          </p:cNvPr>
-          <p:cNvSpPr txBox="1"/>
-          <p:nvPr/>
-        </p:nvSpPr>
-        <p:spPr>
-          <a:xfrm rot="5400000">
-            <a:off x="9288280" y="3104705"/>
-            <a:ext cx="1840440" cy="369332"/>
-          </a:xfrm>
-          <a:prstGeom prst="rect">
-            <a:avLst/>
-          </a:prstGeom>
-          <a:noFill/>
-        </p:spPr>
-        <p:txBody>
-          <a:bodyPr wrap="none" rtlCol="0">
-            <a:spAutoFit/>
-          </a:bodyPr>
-          <a:lstStyle/>
-          <a:p>
-            <a:r>
-              <a:rPr lang="de-DE" sz="1800" dirty="0"/>
-              <a:t>»</a:t>
-            </a:r>
-            <a:r>
-              <a:rPr lang="de-DE" dirty="0"/>
-              <a:t>Fake Computer</a:t>
-            </a:r>
-            <a:r>
-              <a:rPr lang="de-DE" sz="1800" dirty="0"/>
-              <a:t>«</a:t>
-            </a:r>
-            <a:endParaRPr lang="de-DE" dirty="0"/>
-          </a:p>
-        </p:txBody>
-      </p:sp>
-      <p:sp>
-        <p:nvSpPr>
-          <p:cNvPr id="33" name="TextBox 32">
-            <a:extLst>
-              <a:ext uri="{FF2B5EF4-FFF2-40B4-BE49-F238E27FC236}">
-                <a16:creationId xmlns:a16="http://schemas.microsoft.com/office/drawing/2014/main" id="{00EB24FF-9B2B-490D-9208-0693656139ED}"/>
-              </a:ext>
-            </a:extLst>
-          </p:cNvPr>
-          <p:cNvSpPr txBox="1"/>
-          <p:nvPr/>
-        </p:nvSpPr>
-        <p:spPr>
-          <a:xfrm>
-            <a:off x="2572828" y="3563511"/>
-            <a:ext cx="6094562" cy="369332"/>
-          </a:xfrm>
-          <a:prstGeom prst="rect">
-            <a:avLst/>
-          </a:prstGeom>
-          <a:noFill/>
-        </p:spPr>
-        <p:txBody>
-          <a:bodyPr wrap="square">
-            <a:spAutoFit/>
-          </a:bodyPr>
-          <a:lstStyle/>
-          <a:p>
-            <a:r>
-              <a:rPr lang="de-DE" sz="1800" dirty="0"/>
-              <a:t>«»</a:t>
-            </a:r>
-            <a:endParaRPr lang="de-DE" dirty="0"/>
+              <a:t>Ein Linux-Kernel</a:t>
+            </a:r>
           </a:p>
         </p:txBody>
       </p:sp>
     </p:spTree>
     <p:extLst>
       <p:ext uri="{BB962C8B-B14F-4D97-AF65-F5344CB8AC3E}">
-        <p14:creationId xmlns:p14="http://schemas.microsoft.com/office/powerpoint/2010/main" val="2671065053"/>
+        <p14:creationId xmlns:p14="http://schemas.microsoft.com/office/powerpoint/2010/main" val="3315841980"/>
       </p:ext>
     </p:extLst>
   </p:cSld>

</xml_diff>